<commit_message>
threat and risk concepts update
</commit_message>
<xml_diff>
--- a/models/ModelDevelopment/Threat And Risk Concepts.pptx
+++ b/models/ModelDevelopment/Threat And Risk Concepts.pptx
@@ -6,19 +6,21 @@
   </p:sldMasterIdLst>
   <p:sldIdLst>
     <p:sldId id="256" r:id="rId2"/>
-    <p:sldId id="258" r:id="rId3"/>
-    <p:sldId id="263" r:id="rId4"/>
-    <p:sldId id="261" r:id="rId5"/>
-    <p:sldId id="262" r:id="rId6"/>
-    <p:sldId id="264" r:id="rId7"/>
-    <p:sldId id="268" r:id="rId8"/>
-    <p:sldId id="265" r:id="rId9"/>
-    <p:sldId id="266" r:id="rId10"/>
-    <p:sldId id="267" r:id="rId11"/>
-    <p:sldId id="259" r:id="rId12"/>
-    <p:sldId id="260" r:id="rId13"/>
-    <p:sldId id="270" r:id="rId14"/>
-    <p:sldId id="269" r:id="rId15"/>
+    <p:sldId id="271" r:id="rId3"/>
+    <p:sldId id="258" r:id="rId4"/>
+    <p:sldId id="263" r:id="rId5"/>
+    <p:sldId id="261" r:id="rId6"/>
+    <p:sldId id="262" r:id="rId7"/>
+    <p:sldId id="264" r:id="rId8"/>
+    <p:sldId id="268" r:id="rId9"/>
+    <p:sldId id="272" r:id="rId10"/>
+    <p:sldId id="265" r:id="rId11"/>
+    <p:sldId id="266" r:id="rId12"/>
+    <p:sldId id="267" r:id="rId13"/>
+    <p:sldId id="259" r:id="rId14"/>
+    <p:sldId id="260" r:id="rId15"/>
+    <p:sldId id="270" r:id="rId16"/>
+    <p:sldId id="269" r:id="rId17"/>
   </p:sldIdLst>
   <p:sldSz cx="9144000" cy="6858000" type="screen4x3"/>
   <p:notesSz cx="6858000" cy="9144000"/>
@@ -301,7 +303,7 @@
           <a:p>
             <a:fld id="{B671E2A3-0963-4EB7-8B9C-4C71829858D7}" type="datetimeFigureOut">
               <a:rPr lang="en-US" smtClean="0"/>
-              <a:t>8/3/2014</a:t>
+              <a:t>8/4/2014</a:t>
             </a:fld>
             <a:endParaRPr lang="en-US"/>
           </a:p>
@@ -471,7 +473,7 @@
           <a:p>
             <a:fld id="{B671E2A3-0963-4EB7-8B9C-4C71829858D7}" type="datetimeFigureOut">
               <a:rPr lang="en-US" smtClean="0"/>
-              <a:t>8/3/2014</a:t>
+              <a:t>8/4/2014</a:t>
             </a:fld>
             <a:endParaRPr lang="en-US"/>
           </a:p>
@@ -651,7 +653,7 @@
           <a:p>
             <a:fld id="{B671E2A3-0963-4EB7-8B9C-4C71829858D7}" type="datetimeFigureOut">
               <a:rPr lang="en-US" smtClean="0"/>
-              <a:t>8/3/2014</a:t>
+              <a:t>8/4/2014</a:t>
             </a:fld>
             <a:endParaRPr lang="en-US"/>
           </a:p>
@@ -821,7 +823,7 @@
           <a:p>
             <a:fld id="{B671E2A3-0963-4EB7-8B9C-4C71829858D7}" type="datetimeFigureOut">
               <a:rPr lang="en-US" smtClean="0"/>
-              <a:t>8/3/2014</a:t>
+              <a:t>8/4/2014</a:t>
             </a:fld>
             <a:endParaRPr lang="en-US"/>
           </a:p>
@@ -1067,7 +1069,7 @@
           <a:p>
             <a:fld id="{B671E2A3-0963-4EB7-8B9C-4C71829858D7}" type="datetimeFigureOut">
               <a:rPr lang="en-US" smtClean="0"/>
-              <a:t>8/3/2014</a:t>
+              <a:t>8/4/2014</a:t>
             </a:fld>
             <a:endParaRPr lang="en-US"/>
           </a:p>
@@ -1355,7 +1357,7 @@
           <a:p>
             <a:fld id="{B671E2A3-0963-4EB7-8B9C-4C71829858D7}" type="datetimeFigureOut">
               <a:rPr lang="en-US" smtClean="0"/>
-              <a:t>8/3/2014</a:t>
+              <a:t>8/4/2014</a:t>
             </a:fld>
             <a:endParaRPr lang="en-US"/>
           </a:p>
@@ -1777,7 +1779,7 @@
           <a:p>
             <a:fld id="{B671E2A3-0963-4EB7-8B9C-4C71829858D7}" type="datetimeFigureOut">
               <a:rPr lang="en-US" smtClean="0"/>
-              <a:t>8/3/2014</a:t>
+              <a:t>8/4/2014</a:t>
             </a:fld>
             <a:endParaRPr lang="en-US"/>
           </a:p>
@@ -1895,7 +1897,7 @@
           <a:p>
             <a:fld id="{B671E2A3-0963-4EB7-8B9C-4C71829858D7}" type="datetimeFigureOut">
               <a:rPr lang="en-US" smtClean="0"/>
-              <a:t>8/3/2014</a:t>
+              <a:t>8/4/2014</a:t>
             </a:fld>
             <a:endParaRPr lang="en-US"/>
           </a:p>
@@ -1990,7 +1992,7 @@
           <a:p>
             <a:fld id="{B671E2A3-0963-4EB7-8B9C-4C71829858D7}" type="datetimeFigureOut">
               <a:rPr lang="en-US" smtClean="0"/>
-              <a:t>8/3/2014</a:t>
+              <a:t>8/4/2014</a:t>
             </a:fld>
             <a:endParaRPr lang="en-US"/>
           </a:p>
@@ -2267,7 +2269,7 @@
           <a:p>
             <a:fld id="{B671E2A3-0963-4EB7-8B9C-4C71829858D7}" type="datetimeFigureOut">
               <a:rPr lang="en-US" smtClean="0"/>
-              <a:t>8/3/2014</a:t>
+              <a:t>8/4/2014</a:t>
             </a:fld>
             <a:endParaRPr lang="en-US"/>
           </a:p>
@@ -2520,7 +2522,7 @@
           <a:p>
             <a:fld id="{B671E2A3-0963-4EB7-8B9C-4C71829858D7}" type="datetimeFigureOut">
               <a:rPr lang="en-US" smtClean="0"/>
-              <a:t>8/3/2014</a:t>
+              <a:t>8/4/2014</a:t>
             </a:fld>
             <a:endParaRPr lang="en-US"/>
           </a:p>
@@ -2733,7 +2735,7 @@
           <a:p>
             <a:fld id="{B671E2A3-0963-4EB7-8B9C-4C71829858D7}" type="datetimeFigureOut">
               <a:rPr lang="en-US" smtClean="0"/>
-              <a:t>8/3/2014</a:t>
+              <a:t>8/4/2014</a:t>
             </a:fld>
             <a:endParaRPr lang="en-US"/>
           </a:p>
@@ -3191,62 +3193,9 @@
           <a:chExt cx="0" cy="0"/>
         </a:xfrm>
       </p:grpSpPr>
-      <p:sp>
-        <p:nvSpPr>
-          <p:cNvPr id="5" name="Title 4"/>
-          <p:cNvSpPr>
-            <a:spLocks noGrp="1"/>
-          </p:cNvSpPr>
-          <p:nvPr>
-            <p:ph type="title"/>
-          </p:nvPr>
-        </p:nvSpPr>
-        <p:spPr/>
-        <p:txBody>
-          <a:bodyPr/>
-          <a:lstStyle/>
-          <a:p>
-            <a:r>
-              <a:rPr lang="en-US" dirty="0" smtClean="0"/>
-              <a:t>Putting threat and risk together</a:t>
-            </a:r>
-            <a:endParaRPr lang="en-US" dirty="0"/>
-          </a:p>
-        </p:txBody>
-      </p:sp>
-      <p:sp>
-        <p:nvSpPr>
-          <p:cNvPr id="2" name="TextBox 1"/>
-          <p:cNvSpPr txBox="1"/>
-          <p:nvPr/>
-        </p:nvSpPr>
-        <p:spPr>
-          <a:xfrm>
-            <a:off x="4124108" y="5941076"/>
-            <a:ext cx="4841775" cy="338554"/>
-          </a:xfrm>
-          <a:prstGeom prst="rect">
-            <a:avLst/>
-          </a:prstGeom>
-          <a:noFill/>
-        </p:spPr>
-        <p:txBody>
-          <a:bodyPr wrap="none" rtlCol="0">
-            <a:spAutoFit/>
-          </a:bodyPr>
-          <a:lstStyle/>
-          <a:p>
-            <a:r>
-              <a:rPr lang="en-US" sz="1600" dirty="0" smtClean="0"/>
-              <a:t>Note that a situation may be classified by multiple types</a:t>
-            </a:r>
-            <a:endParaRPr lang="en-US" sz="1600" dirty="0"/>
-          </a:p>
-        </p:txBody>
-      </p:sp>
       <p:pic>
         <p:nvPicPr>
-          <p:cNvPr id="3074" name="Picture 2"/>
+          <p:cNvPr id="2053" name="Picture 5"/>
           <p:cNvPicPr>
             <a:picLocks noChangeAspect="1" noChangeArrowheads="1"/>
           </p:cNvPicPr>
@@ -3267,8 +3216,422 @@
         </p:blipFill>
         <p:spPr bwMode="auto">
           <a:xfrm>
-            <a:off x="147638" y="1314450"/>
-            <a:ext cx="8848725" cy="4229100"/>
+            <a:off x="1076325" y="3629025"/>
+            <a:ext cx="6991350" cy="3228975"/>
+          </a:xfrm>
+          <a:prstGeom prst="rect">
+            <a:avLst/>
+          </a:prstGeom>
+          <a:noFill/>
+          <a:ln>
+            <a:noFill/>
+          </a:ln>
+          <a:extLst>
+            <a:ext uri="{909E8E84-426E-40DD-AFC4-6F175D3DCCD1}">
+              <a14:hiddenFill xmlns:a14="http://schemas.microsoft.com/office/drawing/2010/main">
+                <a:solidFill>
+                  <a:schemeClr val="accent1"/>
+                </a:solidFill>
+              </a14:hiddenFill>
+            </a:ext>
+            <a:ext uri="{91240B29-F687-4F45-9708-019B960494DF}">
+              <a14:hiddenLine xmlns:a14="http://schemas.microsoft.com/office/drawing/2010/main" w="9525">
+                <a:solidFill>
+                  <a:schemeClr val="tx1"/>
+                </a:solidFill>
+                <a:miter lim="800000"/>
+                <a:headEnd/>
+                <a:tailEnd/>
+              </a14:hiddenLine>
+            </a:ext>
+          </a:extLst>
+        </p:spPr>
+      </p:pic>
+      <p:sp>
+        <p:nvSpPr>
+          <p:cNvPr id="5" name="Title 4"/>
+          <p:cNvSpPr>
+            <a:spLocks noGrp="1"/>
+          </p:cNvSpPr>
+          <p:nvPr>
+            <p:ph type="title"/>
+          </p:nvPr>
+        </p:nvSpPr>
+        <p:spPr/>
+        <p:txBody>
+          <a:bodyPr/>
+          <a:lstStyle/>
+          <a:p>
+            <a:r>
+              <a:rPr lang="en-US" dirty="0" smtClean="0"/>
+              <a:t>Risk</a:t>
+            </a:r>
+            <a:endParaRPr lang="en-US" dirty="0"/>
+          </a:p>
+        </p:txBody>
+      </p:sp>
+      <p:sp>
+        <p:nvSpPr>
+          <p:cNvPr id="6" name="Content Placeholder 5"/>
+          <p:cNvSpPr>
+            <a:spLocks noGrp="1"/>
+          </p:cNvSpPr>
+          <p:nvPr>
+            <p:ph sz="half" idx="1"/>
+          </p:nvPr>
+        </p:nvSpPr>
+        <p:spPr/>
+        <p:txBody>
+          <a:bodyPr>
+            <a:normAutofit/>
+          </a:bodyPr>
+          <a:lstStyle/>
+          <a:p>
+            <a:r>
+              <a:rPr lang="en-US" sz="2000" dirty="0" smtClean="0"/>
+              <a:t>A </a:t>
+            </a:r>
+            <a:r>
+              <a:rPr lang="en-US" sz="2000" u="sng" dirty="0" smtClean="0"/>
+              <a:t>risky situation </a:t>
+            </a:r>
+            <a:r>
+              <a:rPr lang="en-US" sz="2000" dirty="0" smtClean="0"/>
+              <a:t>is a future situation that </a:t>
+            </a:r>
+            <a:r>
+              <a:rPr lang="en-US" sz="2000" dirty="0" smtClean="0"/>
+              <a:t>has consequences that are a detriment </a:t>
+            </a:r>
+            <a:r>
+              <a:rPr lang="en-US" sz="2000" dirty="0" smtClean="0"/>
+              <a:t>to the objectives of some stakeholder</a:t>
+            </a:r>
+          </a:p>
+          <a:p>
+            <a:r>
+              <a:rPr lang="en-US" sz="2000" dirty="0" smtClean="0"/>
+              <a:t>A risky situation (like all situations) have a net desirability for a stakeholder.</a:t>
+            </a:r>
+            <a:endParaRPr lang="en-US" sz="2000" dirty="0"/>
+          </a:p>
+        </p:txBody>
+      </p:sp>
+      <p:sp>
+        <p:nvSpPr>
+          <p:cNvPr id="4" name="Content Placeholder 3"/>
+          <p:cNvSpPr>
+            <a:spLocks noGrp="1"/>
+          </p:cNvSpPr>
+          <p:nvPr>
+            <p:ph sz="half" idx="2"/>
+          </p:nvPr>
+        </p:nvSpPr>
+        <p:spPr/>
+        <p:txBody>
+          <a:bodyPr>
+            <a:normAutofit/>
+          </a:bodyPr>
+          <a:lstStyle/>
+          <a:p>
+            <a:r>
+              <a:rPr lang="en-US" sz="2000" dirty="0" smtClean="0"/>
+              <a:t>Risky situations correspond to the view of risks as situations or events</a:t>
+            </a:r>
+          </a:p>
+          <a:p>
+            <a:r>
+              <a:rPr lang="en-US" sz="2000" dirty="0" smtClean="0"/>
+              <a:t>Net desirability (negative) corresponds </a:t>
+            </a:r>
+            <a:r>
+              <a:rPr lang="en-US" sz="2000" dirty="0"/>
+              <a:t>to the view of risk as a </a:t>
+            </a:r>
+            <a:r>
+              <a:rPr lang="en-US" sz="2000" dirty="0" smtClean="0"/>
+              <a:t>metric</a:t>
+            </a:r>
+            <a:endParaRPr lang="en-US" sz="2000" dirty="0"/>
+          </a:p>
+          <a:p>
+            <a:endParaRPr lang="en-US" sz="2000" dirty="0"/>
+          </a:p>
+        </p:txBody>
+      </p:sp>
+    </p:spTree>
+    <p:extLst>
+      <p:ext uri="{BB962C8B-B14F-4D97-AF65-F5344CB8AC3E}">
+        <p14:creationId xmlns:p14="http://schemas.microsoft.com/office/powerpoint/2010/main" val="374987084"/>
+      </p:ext>
+    </p:extLst>
+  </p:cSld>
+  <p:clrMapOvr>
+    <a:masterClrMapping/>
+  </p:clrMapOvr>
+  <p:timing>
+    <p:tnLst>
+      <p:par>
+        <p:cTn id="1" dur="indefinite" restart="never" nodeType="tmRoot"/>
+      </p:par>
+    </p:tnLst>
+  </p:timing>
+</p:sld>
+</file>
+
+<file path=ppt/slides/slide11.xml><?xml version="1.0" encoding="utf-8"?>
+<p:sld xmlns:a="http://schemas.openxmlformats.org/drawingml/2006/main" xmlns:r="http://schemas.openxmlformats.org/officeDocument/2006/relationships" xmlns:p="http://schemas.openxmlformats.org/presentationml/2006/main">
+  <p:cSld>
+    <p:spTree>
+      <p:nvGrpSpPr>
+        <p:cNvPr id="1" name=""/>
+        <p:cNvGrpSpPr/>
+        <p:nvPr/>
+      </p:nvGrpSpPr>
+      <p:grpSpPr>
+        <a:xfrm>
+          <a:off x="0" y="0"/>
+          <a:ext cx="0" cy="0"/>
+          <a:chOff x="0" y="0"/>
+          <a:chExt cx="0" cy="0"/>
+        </a:xfrm>
+      </p:grpSpPr>
+      <p:sp>
+        <p:nvSpPr>
+          <p:cNvPr id="2" name="Title 1"/>
+          <p:cNvSpPr>
+            <a:spLocks noGrp="1"/>
+          </p:cNvSpPr>
+          <p:nvPr>
+            <p:ph type="title"/>
+          </p:nvPr>
+        </p:nvSpPr>
+        <p:spPr/>
+        <p:txBody>
+          <a:bodyPr/>
+          <a:lstStyle/>
+          <a:p>
+            <a:r>
+              <a:rPr lang="en-US" dirty="0" smtClean="0"/>
+              <a:t>Threat</a:t>
+            </a:r>
+            <a:endParaRPr lang="en-US" dirty="0"/>
+          </a:p>
+        </p:txBody>
+      </p:sp>
+      <p:sp>
+        <p:nvSpPr>
+          <p:cNvPr id="3" name="Content Placeholder 2"/>
+          <p:cNvSpPr>
+            <a:spLocks noGrp="1"/>
+          </p:cNvSpPr>
+          <p:nvPr>
+            <p:ph sz="half" idx="1"/>
+          </p:nvPr>
+        </p:nvSpPr>
+        <p:spPr>
+          <a:xfrm>
+            <a:off x="389211" y="1295400"/>
+            <a:ext cx="4038600" cy="4525963"/>
+          </a:xfrm>
+        </p:spPr>
+        <p:txBody>
+          <a:bodyPr>
+            <a:normAutofit/>
+          </a:bodyPr>
+          <a:lstStyle/>
+          <a:p>
+            <a:r>
+              <a:rPr lang="en-US" sz="1800" dirty="0" smtClean="0"/>
+              <a:t>A threat is an occurrence that leads to a risky situation that is </a:t>
+            </a:r>
+            <a:r>
+              <a:rPr lang="en-US" sz="1800" dirty="0" smtClean="0"/>
+              <a:t>a potential </a:t>
+            </a:r>
+            <a:r>
+              <a:rPr lang="en-US" sz="1800" dirty="0" smtClean="0"/>
+              <a:t>behavior of a threat actor</a:t>
+            </a:r>
+          </a:p>
+          <a:p>
+            <a:r>
+              <a:rPr lang="en-US" sz="1800" dirty="0" smtClean="0"/>
+              <a:t>A threat is not necessarily intentional</a:t>
+            </a:r>
+            <a:endParaRPr lang="en-US" sz="1800" dirty="0"/>
+          </a:p>
+        </p:txBody>
+      </p:sp>
+      <p:pic>
+        <p:nvPicPr>
+          <p:cNvPr id="6146" name="Picture 2"/>
+          <p:cNvPicPr>
+            <a:picLocks noChangeAspect="1" noChangeArrowheads="1"/>
+          </p:cNvPicPr>
+          <p:nvPr/>
+        </p:nvPicPr>
+        <p:blipFill>
+          <a:blip r:embed="rId2">
+            <a:extLst>
+              <a:ext uri="{28A0092B-C50C-407E-A947-70E740481C1C}">
+                <a14:useLocalDpi xmlns:a14="http://schemas.microsoft.com/office/drawing/2010/main" val="0"/>
+              </a:ext>
+            </a:extLst>
+          </a:blip>
+          <a:srcRect/>
+          <a:stretch>
+            <a:fillRect/>
+          </a:stretch>
+        </p:blipFill>
+        <p:spPr bwMode="auto">
+          <a:xfrm>
+            <a:off x="990600" y="2667000"/>
+            <a:ext cx="7330704" cy="4038600"/>
+          </a:xfrm>
+          <a:prstGeom prst="rect">
+            <a:avLst/>
+          </a:prstGeom>
+          <a:noFill/>
+          <a:ln>
+            <a:noFill/>
+          </a:ln>
+          <a:extLst>
+            <a:ext uri="{909E8E84-426E-40DD-AFC4-6F175D3DCCD1}">
+              <a14:hiddenFill xmlns:a14="http://schemas.microsoft.com/office/drawing/2010/main">
+                <a:solidFill>
+                  <a:schemeClr val="accent1"/>
+                </a:solidFill>
+              </a14:hiddenFill>
+            </a:ext>
+            <a:ext uri="{91240B29-F687-4F45-9708-019B960494DF}">
+              <a14:hiddenLine xmlns:a14="http://schemas.microsoft.com/office/drawing/2010/main" w="9525">
+                <a:solidFill>
+                  <a:schemeClr val="tx1"/>
+                </a:solidFill>
+                <a:miter lim="800000"/>
+                <a:headEnd/>
+                <a:tailEnd/>
+              </a14:hiddenLine>
+            </a:ext>
+          </a:extLst>
+        </p:spPr>
+      </p:pic>
+    </p:spTree>
+    <p:extLst>
+      <p:ext uri="{BB962C8B-B14F-4D97-AF65-F5344CB8AC3E}">
+        <p14:creationId xmlns:p14="http://schemas.microsoft.com/office/powerpoint/2010/main" val="3253301871"/>
+      </p:ext>
+    </p:extLst>
+  </p:cSld>
+  <p:clrMapOvr>
+    <a:masterClrMapping/>
+  </p:clrMapOvr>
+  <p:timing>
+    <p:tnLst>
+      <p:par>
+        <p:cTn id="1" dur="indefinite" restart="never" nodeType="tmRoot"/>
+      </p:par>
+    </p:tnLst>
+  </p:timing>
+</p:sld>
+</file>
+
+<file path=ppt/slides/slide12.xml><?xml version="1.0" encoding="utf-8"?>
+<p:sld xmlns:a="http://schemas.openxmlformats.org/drawingml/2006/main" xmlns:r="http://schemas.openxmlformats.org/officeDocument/2006/relationships" xmlns:p="http://schemas.openxmlformats.org/presentationml/2006/main">
+  <p:cSld>
+    <p:spTree>
+      <p:nvGrpSpPr>
+        <p:cNvPr id="1" name=""/>
+        <p:cNvGrpSpPr/>
+        <p:nvPr/>
+      </p:nvGrpSpPr>
+      <p:grpSpPr>
+        <a:xfrm>
+          <a:off x="0" y="0"/>
+          <a:ext cx="0" cy="0"/>
+          <a:chOff x="0" y="0"/>
+          <a:chExt cx="0" cy="0"/>
+        </a:xfrm>
+      </p:grpSpPr>
+      <p:sp>
+        <p:nvSpPr>
+          <p:cNvPr id="5" name="Title 4"/>
+          <p:cNvSpPr>
+            <a:spLocks noGrp="1"/>
+          </p:cNvSpPr>
+          <p:nvPr>
+            <p:ph type="title"/>
+          </p:nvPr>
+        </p:nvSpPr>
+        <p:spPr/>
+        <p:txBody>
+          <a:bodyPr/>
+          <a:lstStyle/>
+          <a:p>
+            <a:r>
+              <a:rPr lang="en-US" dirty="0" smtClean="0"/>
+              <a:t>Putting threat and risk together</a:t>
+            </a:r>
+            <a:endParaRPr lang="en-US" dirty="0"/>
+          </a:p>
+        </p:txBody>
+      </p:sp>
+      <p:sp>
+        <p:nvSpPr>
+          <p:cNvPr id="2" name="TextBox 1"/>
+          <p:cNvSpPr txBox="1"/>
+          <p:nvPr/>
+        </p:nvSpPr>
+        <p:spPr>
+          <a:xfrm>
+            <a:off x="4124108" y="5941076"/>
+            <a:ext cx="4841775" cy="338554"/>
+          </a:xfrm>
+          <a:prstGeom prst="rect">
+            <a:avLst/>
+          </a:prstGeom>
+          <a:noFill/>
+        </p:spPr>
+        <p:txBody>
+          <a:bodyPr wrap="none" rtlCol="0">
+            <a:spAutoFit/>
+          </a:bodyPr>
+          <a:lstStyle/>
+          <a:p>
+            <a:r>
+              <a:rPr lang="en-US" sz="1600" dirty="0" smtClean="0"/>
+              <a:t>Note that a situation may be classified by multiple types</a:t>
+            </a:r>
+            <a:endParaRPr lang="en-US" sz="1600" dirty="0"/>
+          </a:p>
+        </p:txBody>
+      </p:sp>
+      <p:pic>
+        <p:nvPicPr>
+          <p:cNvPr id="3076" name="Picture 4"/>
+          <p:cNvPicPr>
+            <a:picLocks noChangeAspect="1" noChangeArrowheads="1"/>
+          </p:cNvPicPr>
+          <p:nvPr/>
+        </p:nvPicPr>
+        <p:blipFill>
+          <a:blip r:embed="rId2">
+            <a:extLst>
+              <a:ext uri="{28A0092B-C50C-407E-A947-70E740481C1C}">
+                <a14:useLocalDpi xmlns:a14="http://schemas.microsoft.com/office/drawing/2010/main" val="0"/>
+              </a:ext>
+            </a:extLst>
+          </a:blip>
+          <a:srcRect/>
+          <a:stretch>
+            <a:fillRect/>
+          </a:stretch>
+        </p:blipFill>
+        <p:spPr bwMode="auto">
+          <a:xfrm>
+            <a:off x="176213" y="1300163"/>
+            <a:ext cx="8791575" cy="4257675"/>
           </a:xfrm>
           <a:prstGeom prst="rect">
             <a:avLst/>
@@ -3318,7 +3681,7 @@
 </p:sld>
 </file>
 
-<file path=ppt/slides/slide11.xml><?xml version="1.0" encoding="utf-8"?>
+<file path=ppt/slides/slide13.xml><?xml version="1.0" encoding="utf-8"?>
 <p:sld xmlns:a="http://schemas.openxmlformats.org/drawingml/2006/main" xmlns:r="http://schemas.openxmlformats.org/officeDocument/2006/relationships" xmlns:p="http://schemas.openxmlformats.org/presentationml/2006/main">
   <p:cSld>
     <p:spTree>
@@ -3491,7 +3854,7 @@
 </p:sld>
 </file>
 
-<file path=ppt/slides/slide12.xml><?xml version="1.0" encoding="utf-8"?>
+<file path=ppt/slides/slide14.xml><?xml version="1.0" encoding="utf-8"?>
 <p:sld xmlns:a="http://schemas.openxmlformats.org/drawingml/2006/main" xmlns:r="http://schemas.openxmlformats.org/officeDocument/2006/relationships" xmlns:p="http://schemas.openxmlformats.org/presentationml/2006/main">
   <p:cSld>
     <p:spTree>
@@ -3555,11 +3918,7 @@
           <a:p>
             <a:r>
               <a:rPr lang="en-US" sz="2400" dirty="0" smtClean="0"/>
-              <a:t>Situations involve other things playing </a:t>
-            </a:r>
-            <a:r>
-              <a:rPr lang="en-US" sz="2400" dirty="0" smtClean="0"/>
-              <a:t>roles</a:t>
+              <a:t>Situations involve other things playing roles</a:t>
             </a:r>
           </a:p>
           <a:p>
@@ -3571,15 +3930,7 @@
           <a:p>
             <a:r>
               <a:rPr lang="en-US" sz="2400" dirty="0" smtClean="0"/>
-              <a:t>Roles </a:t>
-            </a:r>
-            <a:r>
-              <a:rPr lang="en-US" sz="2400" dirty="0" smtClean="0"/>
-              <a:t>are types (categorizations) of things involved in </a:t>
-            </a:r>
-            <a:r>
-              <a:rPr lang="en-US" sz="2400" dirty="0" smtClean="0"/>
-              <a:t>situations</a:t>
+              <a:t>Roles are types (categorizations) of things involved in situations</a:t>
             </a:r>
           </a:p>
           <a:p>
@@ -3588,16 +3939,11 @@
               <a:rPr lang="en-US" sz="2000" dirty="0" smtClean="0"/>
               <a:t>E.g. victim, perpetrator, weapon</a:t>
             </a:r>
-            <a:endParaRPr lang="en-US" sz="2000" dirty="0" smtClean="0"/>
           </a:p>
           <a:p>
             <a:r>
               <a:rPr lang="en-US" sz="2400" dirty="0" smtClean="0"/>
-              <a:t>Sometimes the actual thing playing the role is </a:t>
-            </a:r>
-            <a:r>
-              <a:rPr lang="en-US" sz="2400" dirty="0" smtClean="0"/>
-              <a:t>unknown, so the involved element is optional</a:t>
+              <a:t>Sometimes the actual thing playing the role is unknown, so the involved element is optional</a:t>
             </a:r>
             <a:endParaRPr lang="en-US" sz="2400" dirty="0"/>
           </a:p>
@@ -3605,7 +3951,7 @@
       </p:sp>
       <p:pic>
         <p:nvPicPr>
-          <p:cNvPr id="7171" name="Picture 3"/>
+          <p:cNvPr id="5123" name="Picture 3"/>
           <p:cNvPicPr>
             <a:picLocks noChangeAspect="1" noChangeArrowheads="1"/>
           </p:cNvPicPr>
@@ -3677,7 +4023,7 @@
 </p:sld>
 </file>
 
-<file path=ppt/slides/slide13.xml><?xml version="1.0" encoding="utf-8"?>
+<file path=ppt/slides/slide15.xml><?xml version="1.0" encoding="utf-8"?>
 <p:sld xmlns:a="http://schemas.openxmlformats.org/drawingml/2006/main" xmlns:r="http://schemas.openxmlformats.org/officeDocument/2006/relationships" xmlns:p="http://schemas.openxmlformats.org/presentationml/2006/main">
   <p:cSld>
     <p:spTree>
@@ -3730,7 +4076,7 @@
         <p:spPr/>
         <p:txBody>
           <a:bodyPr>
-            <a:normAutofit/>
+            <a:normAutofit lnSpcReduction="10000"/>
           </a:bodyPr>
           <a:lstStyle/>
           <a:p>
@@ -3785,6 +4131,13 @@
               <a:rPr lang="en-US" sz="1400" dirty="0" smtClean="0"/>
               <a:t>Rules</a:t>
             </a:r>
+          </a:p>
+          <a:p>
+            <a:r>
+              <a:rPr lang="en-US" sz="1800" dirty="0" smtClean="0"/>
+              <a:t>Situations can be used as patterns or actualities</a:t>
+            </a:r>
+            <a:endParaRPr lang="en-US" sz="1800" dirty="0" smtClean="0"/>
           </a:p>
         </p:txBody>
       </p:sp>
@@ -3862,7 +4215,7 @@
 </p:sld>
 </file>
 
-<file path=ppt/slides/slide14.xml><?xml version="1.0" encoding="utf-8"?>
+<file path=ppt/slides/slide16.xml><?xml version="1.0" encoding="utf-8"?>
 <p:sld xmlns:a="http://schemas.openxmlformats.org/drawingml/2006/main" xmlns:r="http://schemas.openxmlformats.org/officeDocument/2006/relationships" xmlns:p="http://schemas.openxmlformats.org/presentationml/2006/main">
   <p:cSld>
     <p:spTree>
@@ -4000,6 +4353,462 @@
       </p:grpSpPr>
       <p:sp>
         <p:nvSpPr>
+          <p:cNvPr id="4" name="Title 3"/>
+          <p:cNvSpPr>
+            <a:spLocks noGrp="1"/>
+          </p:cNvSpPr>
+          <p:nvPr>
+            <p:ph type="title"/>
+          </p:nvPr>
+        </p:nvSpPr>
+        <p:spPr/>
+        <p:txBody>
+          <a:bodyPr/>
+          <a:lstStyle/>
+          <a:p>
+            <a:endParaRPr lang="en-US"/>
+          </a:p>
+        </p:txBody>
+      </p:sp>
+      <p:sp>
+        <p:nvSpPr>
+          <p:cNvPr id="5" name="Chevron 4"/>
+          <p:cNvSpPr/>
+          <p:nvPr/>
+        </p:nvSpPr>
+        <p:spPr>
+          <a:xfrm>
+            <a:off x="457200" y="2895600"/>
+            <a:ext cx="2286000" cy="685800"/>
+          </a:xfrm>
+          <a:prstGeom prst="chevron">
+            <a:avLst/>
+          </a:prstGeom>
+          <a:solidFill>
+            <a:schemeClr val="accent2">
+              <a:lumMod val="60000"/>
+              <a:lumOff val="40000"/>
+            </a:schemeClr>
+          </a:solidFill>
+        </p:spPr>
+        <p:style>
+          <a:lnRef idx="2">
+            <a:schemeClr val="accent1">
+              <a:shade val="50000"/>
+            </a:schemeClr>
+          </a:lnRef>
+          <a:fillRef idx="1">
+            <a:schemeClr val="accent1"/>
+          </a:fillRef>
+          <a:effectRef idx="0">
+            <a:schemeClr val="accent1"/>
+          </a:effectRef>
+          <a:fontRef idx="minor">
+            <a:schemeClr val="lt1"/>
+          </a:fontRef>
+        </p:style>
+        <p:txBody>
+          <a:bodyPr rtlCol="0" anchor="ctr"/>
+          <a:lstStyle/>
+          <a:p>
+            <a:pPr algn="ctr"/>
+            <a:r>
+              <a:rPr lang="en-US" sz="1600" dirty="0" smtClean="0">
+                <a:solidFill>
+                  <a:schemeClr val="tx1"/>
+                </a:solidFill>
+              </a:rPr>
+              <a:t>Threat</a:t>
+            </a:r>
+            <a:endParaRPr lang="en-US" sz="1600" dirty="0">
+              <a:solidFill>
+                <a:schemeClr val="tx1"/>
+              </a:solidFill>
+            </a:endParaRPr>
+          </a:p>
+        </p:txBody>
+      </p:sp>
+      <p:sp>
+        <p:nvSpPr>
+          <p:cNvPr id="6" name="Chevron 5"/>
+          <p:cNvSpPr/>
+          <p:nvPr/>
+        </p:nvSpPr>
+        <p:spPr>
+          <a:xfrm>
+            <a:off x="2476500" y="2895600"/>
+            <a:ext cx="2057400" cy="685800"/>
+          </a:xfrm>
+          <a:prstGeom prst="chevron">
+            <a:avLst/>
+          </a:prstGeom>
+          <a:solidFill>
+            <a:schemeClr val="accent2">
+              <a:lumMod val="60000"/>
+              <a:lumOff val="40000"/>
+            </a:schemeClr>
+          </a:solidFill>
+        </p:spPr>
+        <p:style>
+          <a:lnRef idx="2">
+            <a:schemeClr val="accent1">
+              <a:shade val="50000"/>
+            </a:schemeClr>
+          </a:lnRef>
+          <a:fillRef idx="1">
+            <a:schemeClr val="accent1"/>
+          </a:fillRef>
+          <a:effectRef idx="0">
+            <a:schemeClr val="accent1"/>
+          </a:effectRef>
+          <a:fontRef idx="minor">
+            <a:schemeClr val="lt1"/>
+          </a:fontRef>
+        </p:style>
+        <p:txBody>
+          <a:bodyPr rtlCol="0" anchor="ctr"/>
+          <a:lstStyle/>
+          <a:p>
+            <a:pPr algn="ctr"/>
+            <a:r>
+              <a:rPr lang="en-US" sz="1600" dirty="0" smtClean="0">
+                <a:solidFill>
+                  <a:schemeClr val="tx1"/>
+                </a:solidFill>
+              </a:rPr>
+              <a:t>Risky</a:t>
+            </a:r>
+            <a:endParaRPr lang="en-US" sz="1600" dirty="0">
+              <a:solidFill>
+                <a:schemeClr val="tx1"/>
+              </a:solidFill>
+            </a:endParaRPr>
+          </a:p>
+        </p:txBody>
+      </p:sp>
+      <p:sp>
+        <p:nvSpPr>
+          <p:cNvPr id="7" name="Chevron 6"/>
+          <p:cNvSpPr/>
+          <p:nvPr/>
+        </p:nvSpPr>
+        <p:spPr>
+          <a:xfrm>
+            <a:off x="4305300" y="2895600"/>
+            <a:ext cx="2133600" cy="685800"/>
+          </a:xfrm>
+          <a:prstGeom prst="chevron">
+            <a:avLst/>
+          </a:prstGeom>
+          <a:solidFill>
+            <a:schemeClr val="accent2">
+              <a:lumMod val="60000"/>
+              <a:lumOff val="40000"/>
+            </a:schemeClr>
+          </a:solidFill>
+        </p:spPr>
+        <p:style>
+          <a:lnRef idx="2">
+            <a:schemeClr val="accent1">
+              <a:shade val="50000"/>
+            </a:schemeClr>
+          </a:lnRef>
+          <a:fillRef idx="1">
+            <a:schemeClr val="accent1"/>
+          </a:fillRef>
+          <a:effectRef idx="0">
+            <a:schemeClr val="accent1"/>
+          </a:effectRef>
+          <a:fontRef idx="minor">
+            <a:schemeClr val="lt1"/>
+          </a:fontRef>
+        </p:style>
+        <p:txBody>
+          <a:bodyPr rtlCol="0" anchor="ctr"/>
+          <a:lstStyle/>
+          <a:p>
+            <a:pPr algn="ctr"/>
+            <a:r>
+              <a:rPr lang="en-US" sz="1600" dirty="0" smtClean="0">
+                <a:solidFill>
+                  <a:schemeClr val="tx1"/>
+                </a:solidFill>
+              </a:rPr>
+              <a:t>Consequence</a:t>
+            </a:r>
+            <a:endParaRPr lang="en-US" sz="1600" dirty="0">
+              <a:solidFill>
+                <a:schemeClr val="tx1"/>
+              </a:solidFill>
+            </a:endParaRPr>
+          </a:p>
+        </p:txBody>
+      </p:sp>
+      <p:sp>
+        <p:nvSpPr>
+          <p:cNvPr id="8" name="Chevron 7"/>
+          <p:cNvSpPr/>
+          <p:nvPr/>
+        </p:nvSpPr>
+        <p:spPr>
+          <a:xfrm>
+            <a:off x="6210300" y="2895600"/>
+            <a:ext cx="2209800" cy="685800"/>
+          </a:xfrm>
+          <a:prstGeom prst="chevron">
+            <a:avLst/>
+          </a:prstGeom>
+          <a:solidFill>
+            <a:schemeClr val="accent2">
+              <a:lumMod val="60000"/>
+              <a:lumOff val="40000"/>
+            </a:schemeClr>
+          </a:solidFill>
+        </p:spPr>
+        <p:style>
+          <a:lnRef idx="2">
+            <a:schemeClr val="accent1">
+              <a:shade val="50000"/>
+            </a:schemeClr>
+          </a:lnRef>
+          <a:fillRef idx="1">
+            <a:schemeClr val="accent1"/>
+          </a:fillRef>
+          <a:effectRef idx="0">
+            <a:schemeClr val="accent1"/>
+          </a:effectRef>
+          <a:fontRef idx="minor">
+            <a:schemeClr val="lt1"/>
+          </a:fontRef>
+        </p:style>
+        <p:txBody>
+          <a:bodyPr rtlCol="0" anchor="ctr"/>
+          <a:lstStyle/>
+          <a:p>
+            <a:pPr algn="ctr"/>
+            <a:r>
+              <a:rPr lang="en-US" sz="1600" dirty="0" smtClean="0">
+                <a:solidFill>
+                  <a:schemeClr val="tx1"/>
+                </a:solidFill>
+              </a:rPr>
+              <a:t>Impact on Objectives</a:t>
+            </a:r>
+            <a:endParaRPr lang="en-US" sz="1600" dirty="0">
+              <a:solidFill>
+                <a:schemeClr val="tx1"/>
+              </a:solidFill>
+            </a:endParaRPr>
+          </a:p>
+        </p:txBody>
+      </p:sp>
+      <p:sp>
+        <p:nvSpPr>
+          <p:cNvPr id="9" name="Oval 8"/>
+          <p:cNvSpPr/>
+          <p:nvPr/>
+        </p:nvSpPr>
+        <p:spPr>
+          <a:xfrm>
+            <a:off x="762000" y="1828800"/>
+            <a:ext cx="1447800" cy="609600"/>
+          </a:xfrm>
+          <a:prstGeom prst="ellipse">
+            <a:avLst/>
+          </a:prstGeom>
+        </p:spPr>
+        <p:style>
+          <a:lnRef idx="2">
+            <a:schemeClr val="accent1">
+              <a:shade val="50000"/>
+            </a:schemeClr>
+          </a:lnRef>
+          <a:fillRef idx="1">
+            <a:schemeClr val="accent1"/>
+          </a:fillRef>
+          <a:effectRef idx="0">
+            <a:schemeClr val="accent1"/>
+          </a:effectRef>
+          <a:fontRef idx="minor">
+            <a:schemeClr val="lt1"/>
+          </a:fontRef>
+        </p:style>
+        <p:txBody>
+          <a:bodyPr rtlCol="0" anchor="ctr"/>
+          <a:lstStyle/>
+          <a:p>
+            <a:pPr algn="ctr"/>
+            <a:r>
+              <a:rPr lang="en-US" sz="1600" dirty="0" smtClean="0"/>
+              <a:t>Threat</a:t>
+            </a:r>
+          </a:p>
+          <a:p>
+            <a:pPr algn="ctr"/>
+            <a:r>
+              <a:rPr lang="en-US" sz="1600" dirty="0" smtClean="0"/>
+              <a:t>Actor</a:t>
+            </a:r>
+            <a:endParaRPr lang="en-US" sz="1600" dirty="0"/>
+          </a:p>
+        </p:txBody>
+      </p:sp>
+      <p:sp>
+        <p:nvSpPr>
+          <p:cNvPr id="10" name="Oval 9"/>
+          <p:cNvSpPr/>
+          <p:nvPr/>
+        </p:nvSpPr>
+        <p:spPr>
+          <a:xfrm>
+            <a:off x="6553200" y="4091849"/>
+            <a:ext cx="1714500" cy="609600"/>
+          </a:xfrm>
+          <a:prstGeom prst="ellipse">
+            <a:avLst/>
+          </a:prstGeom>
+        </p:spPr>
+        <p:style>
+          <a:lnRef idx="2">
+            <a:schemeClr val="accent1">
+              <a:shade val="50000"/>
+            </a:schemeClr>
+          </a:lnRef>
+          <a:fillRef idx="1">
+            <a:schemeClr val="accent1"/>
+          </a:fillRef>
+          <a:effectRef idx="0">
+            <a:schemeClr val="accent1"/>
+          </a:effectRef>
+          <a:fontRef idx="minor">
+            <a:schemeClr val="lt1"/>
+          </a:fontRef>
+        </p:style>
+        <p:txBody>
+          <a:bodyPr rtlCol="0" anchor="ctr"/>
+          <a:lstStyle/>
+          <a:p>
+            <a:pPr algn="ctr"/>
+            <a:r>
+              <a:rPr lang="en-US" sz="1600" dirty="0" smtClean="0"/>
+              <a:t>Stakeholder</a:t>
+            </a:r>
+            <a:endParaRPr lang="en-US" sz="1600" dirty="0"/>
+          </a:p>
+        </p:txBody>
+      </p:sp>
+      <p:sp>
+        <p:nvSpPr>
+          <p:cNvPr id="11" name="Down Arrow 10"/>
+          <p:cNvSpPr/>
+          <p:nvPr/>
+        </p:nvSpPr>
+        <p:spPr>
+          <a:xfrm>
+            <a:off x="1295400" y="2438400"/>
+            <a:ext cx="381000" cy="457200"/>
+          </a:xfrm>
+          <a:prstGeom prst="downArrow">
+            <a:avLst/>
+          </a:prstGeom>
+        </p:spPr>
+        <p:style>
+          <a:lnRef idx="2">
+            <a:schemeClr val="accent1">
+              <a:shade val="50000"/>
+            </a:schemeClr>
+          </a:lnRef>
+          <a:fillRef idx="1">
+            <a:schemeClr val="accent1"/>
+          </a:fillRef>
+          <a:effectRef idx="0">
+            <a:schemeClr val="accent1"/>
+          </a:effectRef>
+          <a:fontRef idx="minor">
+            <a:schemeClr val="lt1"/>
+          </a:fontRef>
+        </p:style>
+        <p:txBody>
+          <a:bodyPr rtlCol="0" anchor="ctr"/>
+          <a:lstStyle/>
+          <a:p>
+            <a:pPr algn="ctr"/>
+            <a:endParaRPr lang="en-US"/>
+          </a:p>
+        </p:txBody>
+      </p:sp>
+      <p:sp>
+        <p:nvSpPr>
+          <p:cNvPr id="12" name="Down Arrow 11"/>
+          <p:cNvSpPr/>
+          <p:nvPr/>
+        </p:nvSpPr>
+        <p:spPr>
+          <a:xfrm>
+            <a:off x="7124700" y="3602516"/>
+            <a:ext cx="381000" cy="457200"/>
+          </a:xfrm>
+          <a:prstGeom prst="downArrow">
+            <a:avLst/>
+          </a:prstGeom>
+        </p:spPr>
+        <p:style>
+          <a:lnRef idx="2">
+            <a:schemeClr val="accent1">
+              <a:shade val="50000"/>
+            </a:schemeClr>
+          </a:lnRef>
+          <a:fillRef idx="1">
+            <a:schemeClr val="accent1"/>
+          </a:fillRef>
+          <a:effectRef idx="0">
+            <a:schemeClr val="accent1"/>
+          </a:effectRef>
+          <a:fontRef idx="minor">
+            <a:schemeClr val="lt1"/>
+          </a:fontRef>
+        </p:style>
+        <p:txBody>
+          <a:bodyPr rtlCol="0" anchor="ctr"/>
+          <a:lstStyle/>
+          <a:p>
+            <a:pPr algn="ctr"/>
+            <a:endParaRPr lang="en-US"/>
+          </a:p>
+        </p:txBody>
+      </p:sp>
+    </p:spTree>
+    <p:extLst>
+      <p:ext uri="{BB962C8B-B14F-4D97-AF65-F5344CB8AC3E}">
+        <p14:creationId xmlns:p14="http://schemas.microsoft.com/office/powerpoint/2010/main" val="3651868975"/>
+      </p:ext>
+    </p:extLst>
+  </p:cSld>
+  <p:clrMapOvr>
+    <a:masterClrMapping/>
+  </p:clrMapOvr>
+</p:sld>
+</file>
+
+<file path=ppt/slides/slide3.xml><?xml version="1.0" encoding="utf-8"?>
+<p:sld xmlns:a="http://schemas.openxmlformats.org/drawingml/2006/main" xmlns:r="http://schemas.openxmlformats.org/officeDocument/2006/relationships" xmlns:p="http://schemas.openxmlformats.org/presentationml/2006/main">
+  <p:cSld>
+    <p:spTree>
+      <p:nvGrpSpPr>
+        <p:cNvPr id="1" name=""/>
+        <p:cNvGrpSpPr/>
+        <p:nvPr/>
+      </p:nvGrpSpPr>
+      <p:grpSpPr>
+        <a:xfrm>
+          <a:off x="0" y="0"/>
+          <a:ext cx="0" cy="0"/>
+          <a:chOff x="0" y="0"/>
+          <a:chExt cx="0" cy="0"/>
+        </a:xfrm>
+      </p:grpSpPr>
+      <p:sp>
+        <p:nvSpPr>
           <p:cNvPr id="2" name="Title 1"/>
           <p:cNvSpPr>
             <a:spLocks noGrp="1"/>
@@ -4192,7 +5001,7 @@
 </p:sld>
 </file>
 
-<file path=ppt/slides/slide3.xml><?xml version="1.0" encoding="utf-8"?>
+<file path=ppt/slides/slide4.xml><?xml version="1.0" encoding="utf-8"?>
 <p:sld xmlns:a="http://schemas.openxmlformats.org/drawingml/2006/main" xmlns:r="http://schemas.openxmlformats.org/officeDocument/2006/relationships" xmlns:p="http://schemas.openxmlformats.org/presentationml/2006/main">
   <p:cSld>
     <p:spTree>
@@ -4308,7 +5117,7 @@
 </p:sld>
 </file>
 
-<file path=ppt/slides/slide4.xml><?xml version="1.0" encoding="utf-8"?>
+<file path=ppt/slides/slide5.xml><?xml version="1.0" encoding="utf-8"?>
 <p:sld xmlns:a="http://schemas.openxmlformats.org/drawingml/2006/main" xmlns:r="http://schemas.openxmlformats.org/officeDocument/2006/relationships" xmlns:p="http://schemas.openxmlformats.org/presentationml/2006/main">
   <p:cSld>
     <p:spTree>
@@ -4391,8 +5200,19 @@
             <a:pPr lvl="1"/>
             <a:r>
               <a:rPr lang="en-US" dirty="0" smtClean="0"/>
-              <a:t>Future (Expectation)</a:t>
-            </a:r>
+              <a:t>Future (Expectation</a:t>
+            </a:r>
+            <a:r>
+              <a:rPr lang="en-US" dirty="0" smtClean="0"/>
+              <a:t>)</a:t>
+            </a:r>
+          </a:p>
+          <a:p>
+            <a:r>
+              <a:rPr lang="en-US" dirty="0" smtClean="0"/>
+              <a:t>Situations have a likelihood</a:t>
+            </a:r>
+            <a:endParaRPr lang="en-US" dirty="0" smtClean="0"/>
           </a:p>
           <a:p>
             <a:pPr marL="0" indent="0">
@@ -4692,7 +5512,7 @@
 </p:sld>
 </file>
 
-<file path=ppt/slides/slide5.xml><?xml version="1.0" encoding="utf-8"?>
+<file path=ppt/slides/slide6.xml><?xml version="1.0" encoding="utf-8"?>
 <p:sld xmlns:a="http://schemas.openxmlformats.org/drawingml/2006/main" xmlns:r="http://schemas.openxmlformats.org/officeDocument/2006/relationships" xmlns:p="http://schemas.openxmlformats.org/presentationml/2006/main">
   <p:cSld>
     <p:spTree>
@@ -4894,7 +5714,17 @@
           <a:p>
             <a:r>
               <a:rPr lang="en-US" sz="1600" dirty="0" smtClean="0"/>
-              <a:t>The impact of a consequence can be computed from the likelihood, degree of affect and importance</a:t>
+              <a:t>The impact of a consequence can be computed from the likelihood, degree of affect and </a:t>
+            </a:r>
+            <a:r>
+              <a:rPr lang="en-US" sz="1600" dirty="0" smtClean="0"/>
+              <a:t>importance</a:t>
+            </a:r>
+          </a:p>
+          <a:p>
+            <a:r>
+              <a:rPr lang="en-US" sz="1600" dirty="0" smtClean="0"/>
+              <a:t>The desirability of any situation is the net of all the potential consequences.</a:t>
             </a:r>
             <a:endParaRPr lang="en-US" sz="1600" dirty="0"/>
           </a:p>
@@ -5112,7 +5942,7 @@
 </p:sld>
 </file>
 
-<file path=ppt/slides/slide6.xml><?xml version="1.0" encoding="utf-8"?>
+<file path=ppt/slides/slide7.xml><?xml version="1.0" encoding="utf-8"?>
 <p:sld xmlns:a="http://schemas.openxmlformats.org/drawingml/2006/main" xmlns:r="http://schemas.openxmlformats.org/officeDocument/2006/relationships" xmlns:p="http://schemas.openxmlformats.org/presentationml/2006/main">
   <p:cSld>
     <p:spTree>
@@ -5709,7 +6539,7 @@
 </p:sld>
 </file>
 
-<file path=ppt/slides/slide7.xml><?xml version="1.0" encoding="utf-8"?>
+<file path=ppt/slides/slide8.xml><?xml version="1.0" encoding="utf-8"?>
 <p:sld xmlns:a="http://schemas.openxmlformats.org/drawingml/2006/main" xmlns:r="http://schemas.openxmlformats.org/officeDocument/2006/relationships" xmlns:p="http://schemas.openxmlformats.org/presentationml/2006/main">
   <p:cSld>
     <p:spTree>
@@ -5798,7 +6628,25 @@
           <a:p>
             <a:r>
               <a:rPr lang="en-US" sz="2000" dirty="0" smtClean="0"/>
-              <a:t>Desirability * likelihood provide the impact (risk metric for detriments)</a:t>
+              <a:t>Desirability * likelihood provide the impact </a:t>
+            </a:r>
+            <a:r>
+              <a:rPr lang="en-US" sz="2000" dirty="0" smtClean="0"/>
+              <a:t>(</a:t>
+            </a:r>
+            <a:r>
+              <a:rPr lang="en-US" sz="2000" dirty="0" smtClean="0">
+                <a:sym typeface="Wingdings" panose="05000000000000000000" pitchFamily="2" charset="2"/>
+              </a:rPr>
+              <a:t></a:t>
+            </a:r>
+            <a:r>
+              <a:rPr lang="en-US" sz="2000" dirty="0" smtClean="0"/>
+              <a:t>risk </a:t>
+            </a:r>
+            <a:r>
+              <a:rPr lang="en-US" sz="2000" dirty="0" smtClean="0"/>
+              <a:t>metric for detriments)</a:t>
             </a:r>
             <a:endParaRPr lang="en-US" sz="2000" dirty="0"/>
           </a:p>
@@ -5806,7 +6654,7 @@
       </p:sp>
       <p:pic>
         <p:nvPicPr>
-          <p:cNvPr id="1026" name="Picture 2"/>
+          <p:cNvPr id="4" name="Picture 2"/>
           <p:cNvPicPr>
             <a:picLocks noChangeAspect="1" noChangeArrowheads="1"/>
           </p:cNvPicPr>
@@ -5827,8 +6675,8 @@
         </p:blipFill>
         <p:spPr bwMode="auto">
           <a:xfrm>
-            <a:off x="872713" y="3410321"/>
-            <a:ext cx="7410450" cy="3457575"/>
+            <a:off x="866775" y="3581400"/>
+            <a:ext cx="7410450" cy="3038475"/>
           </a:xfrm>
           <a:prstGeom prst="rect">
             <a:avLst/>
@@ -5878,7 +6726,7 @@
 </p:sld>
 </file>
 
-<file path=ppt/slides/slide8.xml><?xml version="1.0" encoding="utf-8"?>
+<file path=ppt/slides/slide9.xml><?xml version="1.0" encoding="utf-8"?>
 <p:sld xmlns:a="http://schemas.openxmlformats.org/drawingml/2006/main" xmlns:r="http://schemas.openxmlformats.org/officeDocument/2006/relationships" xmlns:p="http://schemas.openxmlformats.org/presentationml/2006/main">
   <p:cSld>
     <p:spTree>
@@ -5897,7 +6745,7 @@
       </p:grpSpPr>
       <p:sp>
         <p:nvSpPr>
-          <p:cNvPr id="5" name="Title 4"/>
+          <p:cNvPr id="2" name="Title 1"/>
           <p:cNvSpPr>
             <a:spLocks noGrp="1"/>
           </p:cNvSpPr>
@@ -5912,7 +6760,7 @@
           <a:p>
             <a:r>
               <a:rPr lang="en-US" dirty="0" smtClean="0"/>
-              <a:t>Risk</a:t>
+              <a:t>Desirability</a:t>
             </a:r>
             <a:endParaRPr lang="en-US" dirty="0"/>
           </a:p>
@@ -5920,12 +6768,12 @@
       </p:sp>
       <p:sp>
         <p:nvSpPr>
-          <p:cNvPr id="6" name="Content Placeholder 5"/>
-          <p:cNvSpPr>
-            <a:spLocks noGrp="1"/>
-          </p:cNvSpPr>
-          <p:nvPr>
-            <p:ph sz="half" idx="1"/>
+          <p:cNvPr id="3" name="Content Placeholder 2"/>
+          <p:cNvSpPr>
+            <a:spLocks noGrp="1"/>
+          </p:cNvSpPr>
+          <p:nvPr>
+            <p:ph idx="1"/>
           </p:nvPr>
         </p:nvSpPr>
         <p:spPr/>
@@ -5936,63 +6784,30 @@
           <a:lstStyle/>
           <a:p>
             <a:r>
-              <a:rPr lang="en-US" sz="2000" dirty="0" smtClean="0"/>
-              <a:t>A risk is a future situation that is a detriment to the objectives of some </a:t>
-            </a:r>
-            <a:r>
-              <a:rPr lang="en-US" sz="2000" dirty="0" smtClean="0"/>
-              <a:t>stakeholder</a:t>
-            </a:r>
-          </a:p>
-          <a:p>
-            <a:r>
-              <a:rPr lang="en-US" sz="2000" dirty="0" smtClean="0"/>
-              <a:t>A risk is the consequence of a risky situation </a:t>
-            </a:r>
-            <a:endParaRPr lang="en-US" sz="2000" dirty="0"/>
-          </a:p>
-        </p:txBody>
-      </p:sp>
-      <p:sp>
-        <p:nvSpPr>
-          <p:cNvPr id="2" name="Content Placeholder 1"/>
-          <p:cNvSpPr>
-            <a:spLocks noGrp="1"/>
-          </p:cNvSpPr>
-          <p:nvPr>
-            <p:ph sz="half" idx="2"/>
-          </p:nvPr>
-        </p:nvSpPr>
-        <p:spPr/>
-        <p:txBody>
-          <a:bodyPr>
-            <a:normAutofit/>
-          </a:bodyPr>
-          <a:lstStyle/>
-          <a:p>
-            <a:r>
-              <a:rPr lang="en-US" sz="2000" dirty="0" smtClean="0"/>
-              <a:t>A risky situation is any </a:t>
-            </a:r>
-            <a:r>
-              <a:rPr lang="en-US" sz="2000" dirty="0" smtClean="0"/>
-              <a:t>future situation </a:t>
-            </a:r>
-            <a:r>
-              <a:rPr lang="en-US" sz="2000" dirty="0" smtClean="0"/>
-              <a:t>with </a:t>
-            </a:r>
-            <a:r>
-              <a:rPr lang="en-US" sz="2000" dirty="0" smtClean="0"/>
-              <a:t>risks (e.g. is a detriment to some stakeholder)</a:t>
-            </a:r>
-            <a:endParaRPr lang="en-US" sz="2000" dirty="0"/>
+              <a:rPr lang="en-US" sz="2400" dirty="0" smtClean="0"/>
+              <a:t>The desirability of any situation </a:t>
+            </a:r>
+            <a:r>
+              <a:rPr lang="en-US" sz="2400" i="1" dirty="0" smtClean="0"/>
+              <a:t>for any stakeholder </a:t>
+            </a:r>
+            <a:r>
+              <a:rPr lang="en-US" sz="2400" dirty="0" smtClean="0"/>
+              <a:t>can then be computed based on the desirability of all consequences</a:t>
+            </a:r>
+          </a:p>
+          <a:p>
+            <a:r>
+              <a:rPr lang="en-US" sz="2400" dirty="0" smtClean="0"/>
+              <a:t>“Risk” as a metric is a negative net desirability of a future situation </a:t>
+            </a:r>
+            <a:endParaRPr lang="en-US" sz="2400" dirty="0"/>
           </a:p>
         </p:txBody>
       </p:sp>
       <p:pic>
         <p:nvPicPr>
-          <p:cNvPr id="2052" name="Picture 4"/>
+          <p:cNvPr id="4099" name="Picture 3"/>
           <p:cNvPicPr>
             <a:picLocks noChangeAspect="1" noChangeArrowheads="1"/>
           </p:cNvPicPr>
@@ -6013,8 +6828,8 @@
         </p:blipFill>
         <p:spPr bwMode="auto">
           <a:xfrm>
-            <a:off x="609600" y="3962400"/>
-            <a:ext cx="7990114" cy="2743200"/>
+            <a:off x="914400" y="3962400"/>
+            <a:ext cx="7791450" cy="2657475"/>
           </a:xfrm>
           <a:prstGeom prst="rect">
             <a:avLst/>
@@ -6047,191 +6862,13 @@
     </p:spTree>
     <p:extLst>
       <p:ext uri="{BB962C8B-B14F-4D97-AF65-F5344CB8AC3E}">
-        <p14:creationId xmlns:p14="http://schemas.microsoft.com/office/powerpoint/2010/main" val="374987084"/>
+        <p14:creationId xmlns:p14="http://schemas.microsoft.com/office/powerpoint/2010/main" val="695357381"/>
       </p:ext>
     </p:extLst>
   </p:cSld>
   <p:clrMapOvr>
     <a:masterClrMapping/>
   </p:clrMapOvr>
-  <p:timing>
-    <p:tnLst>
-      <p:par>
-        <p:cTn id="1" dur="indefinite" restart="never" nodeType="tmRoot"/>
-      </p:par>
-    </p:tnLst>
-  </p:timing>
-</p:sld>
-</file>
-
-<file path=ppt/slides/slide9.xml><?xml version="1.0" encoding="utf-8"?>
-<p:sld xmlns:a="http://schemas.openxmlformats.org/drawingml/2006/main" xmlns:r="http://schemas.openxmlformats.org/officeDocument/2006/relationships" xmlns:p="http://schemas.openxmlformats.org/presentationml/2006/main">
-  <p:cSld>
-    <p:spTree>
-      <p:nvGrpSpPr>
-        <p:cNvPr id="1" name=""/>
-        <p:cNvGrpSpPr/>
-        <p:nvPr/>
-      </p:nvGrpSpPr>
-      <p:grpSpPr>
-        <a:xfrm>
-          <a:off x="0" y="0"/>
-          <a:ext cx="0" cy="0"/>
-          <a:chOff x="0" y="0"/>
-          <a:chExt cx="0" cy="0"/>
-        </a:xfrm>
-      </p:grpSpPr>
-      <p:sp>
-        <p:nvSpPr>
-          <p:cNvPr id="2" name="Title 1"/>
-          <p:cNvSpPr>
-            <a:spLocks noGrp="1"/>
-          </p:cNvSpPr>
-          <p:nvPr>
-            <p:ph type="title"/>
-          </p:nvPr>
-        </p:nvSpPr>
-        <p:spPr/>
-        <p:txBody>
-          <a:bodyPr/>
-          <a:lstStyle/>
-          <a:p>
-            <a:r>
-              <a:rPr lang="en-US" dirty="0" smtClean="0"/>
-              <a:t>Threat</a:t>
-            </a:r>
-            <a:endParaRPr lang="en-US" dirty="0"/>
-          </a:p>
-        </p:txBody>
-      </p:sp>
-      <p:sp>
-        <p:nvSpPr>
-          <p:cNvPr id="3" name="Content Placeholder 2"/>
-          <p:cNvSpPr>
-            <a:spLocks noGrp="1"/>
-          </p:cNvSpPr>
-          <p:nvPr>
-            <p:ph sz="half" idx="1"/>
-          </p:nvPr>
-        </p:nvSpPr>
-        <p:spPr>
-          <a:xfrm>
-            <a:off x="389211" y="1295400"/>
-            <a:ext cx="4038600" cy="4525963"/>
-          </a:xfrm>
-        </p:spPr>
-        <p:txBody>
-          <a:bodyPr>
-            <a:normAutofit/>
-          </a:bodyPr>
-          <a:lstStyle/>
-          <a:p>
-            <a:r>
-              <a:rPr lang="en-US" sz="1800" dirty="0" smtClean="0"/>
-              <a:t>A threat is an occurrence </a:t>
-            </a:r>
-            <a:r>
-              <a:rPr lang="en-US" sz="1800" dirty="0" smtClean="0"/>
-              <a:t>that </a:t>
-            </a:r>
-            <a:r>
-              <a:rPr lang="en-US" sz="1800" dirty="0" smtClean="0"/>
-              <a:t>leads to a risky </a:t>
-            </a:r>
-            <a:r>
-              <a:rPr lang="en-US" sz="1800" dirty="0" smtClean="0"/>
-              <a:t>situation that is potential behavior of a threat actor</a:t>
-            </a:r>
-            <a:endParaRPr lang="en-US" sz="1800" dirty="0" smtClean="0"/>
-          </a:p>
-          <a:p>
-            <a:r>
-              <a:rPr lang="en-US" sz="1800" dirty="0" smtClean="0"/>
-              <a:t>A threat </a:t>
-            </a:r>
-            <a:r>
-              <a:rPr lang="en-US" sz="1800" dirty="0" smtClean="0"/>
-              <a:t>is not necessarily </a:t>
-            </a:r>
-            <a:r>
-              <a:rPr lang="en-US" sz="1800" dirty="0" smtClean="0"/>
-              <a:t>intentional</a:t>
-            </a:r>
-            <a:endParaRPr lang="en-US" sz="1800" dirty="0"/>
-          </a:p>
-        </p:txBody>
-      </p:sp>
-      <p:pic>
-        <p:nvPicPr>
-          <p:cNvPr id="4099" name="Picture 3"/>
-          <p:cNvPicPr>
-            <a:picLocks noChangeAspect="1" noChangeArrowheads="1"/>
-          </p:cNvPicPr>
-          <p:nvPr/>
-        </p:nvPicPr>
-        <p:blipFill>
-          <a:blip r:embed="rId2">
-            <a:extLst>
-              <a:ext uri="{28A0092B-C50C-407E-A947-70E740481C1C}">
-                <a14:useLocalDpi xmlns:a14="http://schemas.microsoft.com/office/drawing/2010/main" val="0"/>
-              </a:ext>
-            </a:extLst>
-          </a:blip>
-          <a:srcRect/>
-          <a:stretch>
-            <a:fillRect/>
-          </a:stretch>
-        </p:blipFill>
-        <p:spPr bwMode="auto">
-          <a:xfrm>
-            <a:off x="990600" y="3048000"/>
-            <a:ext cx="6874423" cy="3505200"/>
-          </a:xfrm>
-          <a:prstGeom prst="rect">
-            <a:avLst/>
-          </a:prstGeom>
-          <a:noFill/>
-          <a:ln>
-            <a:noFill/>
-          </a:ln>
-          <a:extLst>
-            <a:ext uri="{909E8E84-426E-40DD-AFC4-6F175D3DCCD1}">
-              <a14:hiddenFill xmlns:a14="http://schemas.microsoft.com/office/drawing/2010/main">
-                <a:solidFill>
-                  <a:schemeClr val="accent1"/>
-                </a:solidFill>
-              </a14:hiddenFill>
-            </a:ext>
-            <a:ext uri="{91240B29-F687-4F45-9708-019B960494DF}">
-              <a14:hiddenLine xmlns:a14="http://schemas.microsoft.com/office/drawing/2010/main" w="9525">
-                <a:solidFill>
-                  <a:schemeClr val="tx1"/>
-                </a:solidFill>
-                <a:miter lim="800000"/>
-                <a:headEnd/>
-                <a:tailEnd/>
-              </a14:hiddenLine>
-            </a:ext>
-          </a:extLst>
-        </p:spPr>
-      </p:pic>
-    </p:spTree>
-    <p:extLst>
-      <p:ext uri="{BB962C8B-B14F-4D97-AF65-F5344CB8AC3E}">
-        <p14:creationId xmlns:p14="http://schemas.microsoft.com/office/powerpoint/2010/main" val="3253301871"/>
-      </p:ext>
-    </p:extLst>
-  </p:cSld>
-  <p:clrMapOvr>
-    <a:masterClrMapping/>
-  </p:clrMapOvr>
-  <p:timing>
-    <p:tnLst>
-      <p:par>
-        <p:cTn id="1" dur="indefinite" restart="never" nodeType="tmRoot"/>
-      </p:par>
-    </p:tnLst>
-  </p:timing>
 </p:sld>
 </file>
 

</xml_diff>

<commit_message>
External references and connections
</commit_message>
<xml_diff>
--- a/models/ModelDevelopment/Threat And Risk Concepts.pptx
+++ b/models/ModelDevelopment/Threat And Risk Concepts.pptx
@@ -24,8 +24,7 @@
     <p:sldId id="269" r:id="rId18"/>
     <p:sldId id="274" r:id="rId19"/>
     <p:sldId id="275" r:id="rId20"/>
-    <p:sldId id="277" r:id="rId21"/>
-    <p:sldId id="276" r:id="rId22"/>
+    <p:sldId id="276" r:id="rId21"/>
   </p:sldIdLst>
   <p:sldSz cx="9144000" cy="6858000" type="screen4x3"/>
   <p:notesSz cx="6858000" cy="9144000"/>
@@ -5282,181 +5281,6 @@
 </file>
 
 <file path=ppt/slides/slide20.xml><?xml version="1.0" encoding="utf-8"?>
-<p:sld xmlns:a="http://schemas.openxmlformats.org/drawingml/2006/main" xmlns:r="http://schemas.openxmlformats.org/officeDocument/2006/relationships" xmlns:p="http://schemas.openxmlformats.org/presentationml/2006/main">
-  <p:cSld>
-    <p:spTree>
-      <p:nvGrpSpPr>
-        <p:cNvPr id="1" name=""/>
-        <p:cNvGrpSpPr/>
-        <p:nvPr/>
-      </p:nvGrpSpPr>
-      <p:grpSpPr>
-        <a:xfrm>
-          <a:off x="0" y="0"/>
-          <a:ext cx="0" cy="0"/>
-          <a:chOff x="0" y="0"/>
-          <a:chExt cx="0" cy="0"/>
-        </a:xfrm>
-      </p:grpSpPr>
-      <p:sp>
-        <p:nvSpPr>
-          <p:cNvPr id="2" name="Title 1"/>
-          <p:cNvSpPr>
-            <a:spLocks noGrp="1"/>
-          </p:cNvSpPr>
-          <p:nvPr>
-            <p:ph type="title"/>
-          </p:nvPr>
-        </p:nvSpPr>
-        <p:spPr/>
-        <p:txBody>
-          <a:bodyPr>
-            <a:normAutofit fontScale="90000"/>
-          </a:bodyPr>
-          <a:lstStyle/>
-          <a:p>
-            <a:r>
-              <a:rPr lang="en-US" dirty="0" smtClean="0"/>
-              <a:t>Enterprise Risk management vendors</a:t>
-            </a:r>
-            <a:endParaRPr lang="en-US" dirty="0"/>
-          </a:p>
-        </p:txBody>
-      </p:sp>
-      <p:sp>
-        <p:nvSpPr>
-          <p:cNvPr id="3" name="Content Placeholder 2"/>
-          <p:cNvSpPr>
-            <a:spLocks noGrp="1"/>
-          </p:cNvSpPr>
-          <p:nvPr>
-            <p:ph idx="1"/>
-          </p:nvPr>
-        </p:nvSpPr>
-        <p:spPr/>
-        <p:txBody>
-          <a:bodyPr>
-            <a:normAutofit/>
-          </a:bodyPr>
-          <a:lstStyle/>
-          <a:p>
-            <a:r>
-              <a:rPr lang="en-US" sz="2400" dirty="0">
-                <a:hlinkClick r:id="rId2"/>
-              </a:rPr>
-              <a:t>http://</a:t>
-            </a:r>
-            <a:r>
-              <a:rPr lang="en-US" sz="2400" dirty="0" smtClean="0">
-                <a:hlinkClick r:id="rId2"/>
-              </a:rPr>
-              <a:t>www.metricstream.com/solutions/risk_management.htm</a:t>
-            </a:r>
-            <a:endParaRPr lang="en-US" sz="2400" dirty="0" smtClean="0"/>
-          </a:p>
-          <a:p>
-            <a:r>
-              <a:rPr lang="en-US" sz="2400" dirty="0">
-                <a:hlinkClick r:id="rId3"/>
-              </a:rPr>
-              <a:t>http://www.lockpath.com</a:t>
-            </a:r>
-            <a:r>
-              <a:rPr lang="en-US" sz="2400" dirty="0" smtClean="0">
-                <a:hlinkClick r:id="rId3"/>
-              </a:rPr>
-              <a:t>/</a:t>
-            </a:r>
-            <a:endParaRPr lang="en-US" sz="2400" dirty="0" smtClean="0"/>
-          </a:p>
-          <a:p>
-            <a:r>
-              <a:rPr lang="en-US" sz="2400" dirty="0">
-                <a:hlinkClick r:id="rId4"/>
-              </a:rPr>
-              <a:t>http://www.emc.com/security/rsa-archer.htm#!</a:t>
-            </a:r>
-            <a:r>
-              <a:rPr lang="en-US" sz="2400" dirty="0" smtClean="0">
-                <a:hlinkClick r:id="rId4"/>
-              </a:rPr>
-              <a:t>details</a:t>
-            </a:r>
-            <a:endParaRPr lang="en-US" sz="2400" dirty="0" smtClean="0"/>
-          </a:p>
-          <a:p>
-            <a:r>
-              <a:rPr lang="en-US" sz="2400" dirty="0">
-                <a:hlinkClick r:id="rId5"/>
-              </a:rPr>
-              <a:t>http://</a:t>
-            </a:r>
-            <a:r>
-              <a:rPr lang="en-US" sz="2400" dirty="0" smtClean="0">
-                <a:hlinkClick r:id="rId5"/>
-              </a:rPr>
-              <a:t>accelus.thomsonreuters.com/products/accelus-risk-manager?gclid=CJLb6s2Pp8ACFahj7Aod1Q8AJQ</a:t>
-            </a:r>
-            <a:endParaRPr lang="en-US" sz="2400" dirty="0" smtClean="0"/>
-          </a:p>
-          <a:p>
-            <a:r>
-              <a:rPr lang="en-US" sz="2400" dirty="0">
-                <a:hlinkClick r:id="rId6"/>
-              </a:rPr>
-              <a:t>http://www-03.ibm.com/software/products/en/openpages-operational-risk-management</a:t>
-            </a:r>
-            <a:r>
-              <a:rPr lang="en-US" sz="2400" dirty="0" smtClean="0">
-                <a:hlinkClick r:id="rId6"/>
-              </a:rPr>
-              <a:t>/</a:t>
-            </a:r>
-            <a:endParaRPr lang="en-US" sz="2400" dirty="0" smtClean="0"/>
-          </a:p>
-          <a:p>
-            <a:r>
-              <a:rPr lang="en-US" sz="2400">
-                <a:hlinkClick r:id="rId7"/>
-              </a:rPr>
-              <a:t>http</a:t>
-            </a:r>
-            <a:r>
-              <a:rPr lang="en-US" sz="2400">
-                <a:hlinkClick r:id="rId7"/>
-              </a:rPr>
-              <a:t>://</a:t>
-            </a:r>
-            <a:r>
-              <a:rPr lang="en-US" sz="2400" smtClean="0">
-                <a:hlinkClick r:id="rId7"/>
-              </a:rPr>
-              <a:t>www.sap.com/pc/bp/eam/software/operational-risk-management/index.html</a:t>
-            </a:r>
-            <a:endParaRPr lang="en-US" sz="2400" smtClean="0"/>
-          </a:p>
-          <a:p>
-            <a:endParaRPr lang="en-US" sz="2400" dirty="0" smtClean="0"/>
-          </a:p>
-          <a:p>
-            <a:endParaRPr lang="en-US" sz="2400" dirty="0"/>
-          </a:p>
-        </p:txBody>
-      </p:sp>
-    </p:spTree>
-    <p:extLst>
-      <p:ext uri="{BB962C8B-B14F-4D97-AF65-F5344CB8AC3E}">
-        <p14:creationId xmlns:p14="http://schemas.microsoft.com/office/powerpoint/2010/main" val="3047139018"/>
-      </p:ext>
-    </p:extLst>
-  </p:cSld>
-  <p:clrMapOvr>
-    <a:masterClrMapping/>
-  </p:clrMapOvr>
-</p:sld>
-</file>
-
-<file path=ppt/slides/slide21.xml><?xml version="1.0" encoding="utf-8"?>
 <p:sld xmlns:a="http://schemas.openxmlformats.org/drawingml/2006/main" xmlns:r="http://schemas.openxmlformats.org/officeDocument/2006/relationships" xmlns:p="http://schemas.openxmlformats.org/presentationml/2006/main">
   <p:cSld>
     <p:spTree>

</xml_diff>